<commit_message>
Updated presentation, added challenge from email
</commit_message>
<xml_diff>
--- a/angular/src/assets/goals.pptx
+++ b/angular/src/assets/goals.pptx
@@ -11,6 +11,9 @@
     <p:sldId id="262" r:id="rId5"/>
     <p:sldId id="263" r:id="rId6"/>
     <p:sldId id="264" r:id="rId7"/>
+    <p:sldId id="266" r:id="rId8"/>
+    <p:sldId id="267" r:id="rId9"/>
+    <p:sldId id="265" r:id="rId10"/>
   </p:sldIdLst>
   <p:sldSz cx="12192000" cy="6858000"/>
   <p:notesSz cx="6858000" cy="9144000"/>
@@ -109,6 +112,11 @@
       </a:defRPr>
     </a:lvl9pPr>
   </p:defaultTextStyle>
+  <p:extLst>
+    <p:ext uri="{EFAFB233-063F-42B5-8137-9DF3F51BA10A}">
+      <p15:sldGuideLst xmlns:p15="http://schemas.microsoft.com/office/powerpoint/2012/main"/>
+    </p:ext>
+  </p:extLst>
 </p:presentation>
 </file>
 
@@ -6014,7 +6022,7 @@
         </p:nvSpPr>
         <p:spPr>
           <a:xfrm>
-            <a:off x="1107249" y="1447800"/>
+            <a:off x="1067494" y="1447800"/>
             <a:ext cx="8825658" cy="3329581"/>
           </a:xfrm>
         </p:spPr>
@@ -6023,10 +6031,10 @@
           <a:lstStyle/>
           <a:p>
             <a:r>
-              <a:rPr lang="en-US" dirty="0" smtClean="0"/>
+              <a:rPr lang="en-US" sz="8000" dirty="0" smtClean="0"/>
               <a:t>Carnival POS</a:t>
             </a:r>
-            <a:endParaRPr lang="en-US" dirty="0"/>
+            <a:endParaRPr lang="en-US" sz="8000" dirty="0"/>
           </a:p>
         </p:txBody>
       </p:sp>
@@ -6151,29 +6159,15 @@
               <a:rPr lang="en-US" dirty="0" smtClean="0"/>
               <a:t>Firebase </a:t>
             </a:r>
-            <a:endParaRPr lang="en-US" dirty="0"/>
+            <a:endParaRPr lang="en-US" dirty="0" smtClean="0"/>
           </a:p>
           <a:p>
             <a:pPr lvl="1"/>
             <a:r>
-              <a:rPr lang="en-US" i="1" dirty="0" smtClean="0">
-                <a:hlinkClick r:id="rId2"/>
-              </a:rPr>
-              <a:t>https</a:t>
-            </a:r>
-            <a:r>
-              <a:rPr lang="en-US" i="1" dirty="0">
-                <a:hlinkClick r:id="rId2"/>
-              </a:rPr>
-              <a:t>://</a:t>
-            </a:r>
-            <a:r>
-              <a:rPr lang="en-US" i="1" dirty="0" smtClean="0">
-                <a:hlinkClick r:id="rId2"/>
-              </a:rPr>
-              <a:t>github.com/code-monkie/carnival-pos</a:t>
-            </a:r>
-            <a:endParaRPr lang="en-US" i="1" dirty="0" smtClean="0"/>
+              <a:rPr lang="en-US" dirty="0" err="1" smtClean="0"/>
+              <a:t>Github</a:t>
+            </a:r>
+            <a:endParaRPr lang="en-US" dirty="0"/>
           </a:p>
         </p:txBody>
       </p:sp>
@@ -6730,6 +6724,420 @@
     <p:extLst>
       <p:ext uri="{BB962C8B-B14F-4D97-AF65-F5344CB8AC3E}">
         <p14:creationId xmlns:p14="http://schemas.microsoft.com/office/powerpoint/2010/main" val="3484986951"/>
+      </p:ext>
+    </p:extLst>
+  </p:cSld>
+  <p:clrMapOvr>
+    <a:masterClrMapping/>
+  </p:clrMapOvr>
+</p:sld>
+</file>
+
+<file path=ppt/slides/slide7.xml><?xml version="1.0" encoding="utf-8"?>
+<p:sld xmlns:a="http://schemas.openxmlformats.org/drawingml/2006/main" xmlns:r="http://schemas.openxmlformats.org/officeDocument/2006/relationships" xmlns:p="http://schemas.openxmlformats.org/presentationml/2006/main">
+  <p:cSld>
+    <p:spTree>
+      <p:nvGrpSpPr>
+        <p:cNvPr id="1" name=""/>
+        <p:cNvGrpSpPr/>
+        <p:nvPr/>
+      </p:nvGrpSpPr>
+      <p:grpSpPr>
+        <a:xfrm>
+          <a:off x="0" y="0"/>
+          <a:ext cx="0" cy="0"/>
+          <a:chOff x="0" y="0"/>
+          <a:chExt cx="0" cy="0"/>
+        </a:xfrm>
+      </p:grpSpPr>
+      <p:sp>
+        <p:nvSpPr>
+          <p:cNvPr id="2" name="Title 1"/>
+          <p:cNvSpPr>
+            <a:spLocks noGrp="1"/>
+          </p:cNvSpPr>
+          <p:nvPr>
+            <p:ph type="title"/>
+          </p:nvPr>
+        </p:nvSpPr>
+        <p:spPr/>
+        <p:txBody>
+          <a:bodyPr/>
+          <a:lstStyle/>
+          <a:p>
+            <a:r>
+              <a:rPr lang="en-US" dirty="0" smtClean="0"/>
+              <a:t>The Features: Customers</a:t>
+            </a:r>
+            <a:endParaRPr lang="en-US" dirty="0"/>
+          </a:p>
+        </p:txBody>
+      </p:sp>
+      <p:sp>
+        <p:nvSpPr>
+          <p:cNvPr id="3" name="Content Placeholder 2"/>
+          <p:cNvSpPr>
+            <a:spLocks noGrp="1"/>
+          </p:cNvSpPr>
+          <p:nvPr>
+            <p:ph idx="1"/>
+          </p:nvPr>
+        </p:nvSpPr>
+        <p:spPr>
+          <a:xfrm>
+            <a:off x="1103312" y="1655349"/>
+            <a:ext cx="8946541" cy="4195481"/>
+          </a:xfrm>
+        </p:spPr>
+        <p:txBody>
+          <a:bodyPr/>
+          <a:lstStyle/>
+          <a:p>
+            <a:r>
+              <a:rPr lang="en-US" dirty="0" smtClean="0"/>
+              <a:t>Anyone can order</a:t>
+            </a:r>
+          </a:p>
+          <a:p>
+            <a:r>
+              <a:rPr lang="en-US" dirty="0" smtClean="0"/>
+              <a:t>Orders are instantly delivered for fulfillment</a:t>
+            </a:r>
+          </a:p>
+          <a:p>
+            <a:r>
+              <a:rPr lang="en-US" dirty="0" smtClean="0"/>
+              <a:t>Menu includes individual items and combos</a:t>
+            </a:r>
+          </a:p>
+          <a:p>
+            <a:r>
+              <a:rPr lang="en-US" dirty="0" smtClean="0"/>
+              <a:t>Includes limiting menu items per order</a:t>
+            </a:r>
+          </a:p>
+          <a:p>
+            <a:r>
+              <a:rPr lang="en-US" dirty="0" smtClean="0"/>
+              <a:t>Does not include</a:t>
+            </a:r>
+          </a:p>
+          <a:p>
+            <a:pPr lvl="1"/>
+            <a:r>
+              <a:rPr lang="en-US" dirty="0" smtClean="0"/>
+              <a:t>Extras</a:t>
+            </a:r>
+          </a:p>
+          <a:p>
+            <a:pPr lvl="1"/>
+            <a:r>
+              <a:rPr lang="en-US" dirty="0" smtClean="0"/>
+              <a:t>Inventory control</a:t>
+            </a:r>
+            <a:endParaRPr lang="en-US" dirty="0"/>
+          </a:p>
+          <a:p>
+            <a:pPr marL="0" indent="0">
+              <a:buNone/>
+            </a:pPr>
+            <a:r>
+              <a:rPr lang="en-US" dirty="0" smtClean="0"/>
+              <a:t>			</a:t>
+            </a:r>
+            <a:endParaRPr lang="en-US" dirty="0"/>
+          </a:p>
+        </p:txBody>
+      </p:sp>
+    </p:spTree>
+    <p:extLst>
+      <p:ext uri="{BB962C8B-B14F-4D97-AF65-F5344CB8AC3E}">
+        <p14:creationId xmlns:p14="http://schemas.microsoft.com/office/powerpoint/2010/main" val="636203607"/>
+      </p:ext>
+    </p:extLst>
+  </p:cSld>
+  <p:clrMapOvr>
+    <a:masterClrMapping/>
+  </p:clrMapOvr>
+</p:sld>
+</file>
+
+<file path=ppt/slides/slide8.xml><?xml version="1.0" encoding="utf-8"?>
+<p:sld xmlns:a="http://schemas.openxmlformats.org/drawingml/2006/main" xmlns:r="http://schemas.openxmlformats.org/officeDocument/2006/relationships" xmlns:p="http://schemas.openxmlformats.org/presentationml/2006/main">
+  <p:cSld>
+    <p:spTree>
+      <p:nvGrpSpPr>
+        <p:cNvPr id="1" name=""/>
+        <p:cNvGrpSpPr/>
+        <p:nvPr/>
+      </p:nvGrpSpPr>
+      <p:grpSpPr>
+        <a:xfrm>
+          <a:off x="0" y="0"/>
+          <a:ext cx="0" cy="0"/>
+          <a:chOff x="0" y="0"/>
+          <a:chExt cx="0" cy="0"/>
+        </a:xfrm>
+      </p:grpSpPr>
+      <p:sp>
+        <p:nvSpPr>
+          <p:cNvPr id="2" name="Title 1"/>
+          <p:cNvSpPr>
+            <a:spLocks noGrp="1"/>
+          </p:cNvSpPr>
+          <p:nvPr>
+            <p:ph type="title"/>
+          </p:nvPr>
+        </p:nvSpPr>
+        <p:spPr/>
+        <p:txBody>
+          <a:bodyPr/>
+          <a:lstStyle/>
+          <a:p>
+            <a:r>
+              <a:rPr lang="en-US" dirty="0" smtClean="0"/>
+              <a:t>The Features: Carnival</a:t>
+            </a:r>
+            <a:endParaRPr lang="en-US" dirty="0"/>
+          </a:p>
+        </p:txBody>
+      </p:sp>
+      <p:sp>
+        <p:nvSpPr>
+          <p:cNvPr id="3" name="Content Placeholder 2"/>
+          <p:cNvSpPr>
+            <a:spLocks noGrp="1"/>
+          </p:cNvSpPr>
+          <p:nvPr>
+            <p:ph idx="1"/>
+          </p:nvPr>
+        </p:nvSpPr>
+        <p:spPr>
+          <a:xfrm>
+            <a:off x="1103312" y="1671255"/>
+            <a:ext cx="8946541" cy="4195481"/>
+          </a:xfrm>
+        </p:spPr>
+        <p:txBody>
+          <a:bodyPr/>
+          <a:lstStyle/>
+          <a:p>
+            <a:r>
+              <a:rPr lang="en-US" dirty="0" smtClean="0"/>
+              <a:t>Dashboard to manage fulfillment</a:t>
+            </a:r>
+          </a:p>
+          <a:p>
+            <a:pPr lvl="1"/>
+            <a:r>
+              <a:rPr lang="en-US" dirty="0" smtClean="0"/>
+              <a:t>Real-time updates for new and fulfilled orders</a:t>
+            </a:r>
+          </a:p>
+          <a:p>
+            <a:pPr lvl="1"/>
+            <a:r>
+              <a:rPr lang="en-US" dirty="0" smtClean="0"/>
+              <a:t>Reject all the clowns you want (which is all of them)</a:t>
+            </a:r>
+          </a:p>
+          <a:p>
+            <a:r>
+              <a:rPr lang="en-US" dirty="0" smtClean="0"/>
+              <a:t>View order history</a:t>
+            </a:r>
+          </a:p>
+          <a:p>
+            <a:pPr lvl="1"/>
+            <a:r>
+              <a:rPr lang="en-US" dirty="0" smtClean="0"/>
+              <a:t>Manage returns here</a:t>
+            </a:r>
+          </a:p>
+          <a:p>
+            <a:pPr lvl="1"/>
+            <a:r>
+              <a:rPr lang="en-US" dirty="0" smtClean="0"/>
+              <a:t>Can print order history </a:t>
+            </a:r>
+          </a:p>
+          <a:p>
+            <a:pPr lvl="2"/>
+            <a:r>
+              <a:rPr lang="en-US" dirty="0" smtClean="0"/>
+              <a:t>Cannot print individual orders</a:t>
+            </a:r>
+          </a:p>
+          <a:p>
+            <a:pPr lvl="2"/>
+            <a:r>
+              <a:rPr lang="en-US" dirty="0" smtClean="0"/>
+              <a:t>No daily summary</a:t>
+            </a:r>
+          </a:p>
+          <a:p>
+            <a:r>
+              <a:rPr lang="en-US" dirty="0" smtClean="0"/>
+              <a:t>Authentication</a:t>
+            </a:r>
+          </a:p>
+          <a:p>
+            <a:pPr lvl="1"/>
+            <a:r>
+              <a:rPr lang="en-US" dirty="0" smtClean="0"/>
+              <a:t>Must login to be able to process orders or view order history</a:t>
+            </a:r>
+          </a:p>
+          <a:p>
+            <a:pPr lvl="1"/>
+            <a:endParaRPr lang="en-US" dirty="0"/>
+          </a:p>
+        </p:txBody>
+      </p:sp>
+    </p:spTree>
+    <p:extLst>
+      <p:ext uri="{BB962C8B-B14F-4D97-AF65-F5344CB8AC3E}">
+        <p14:creationId xmlns:p14="http://schemas.microsoft.com/office/powerpoint/2010/main" val="2557323678"/>
+      </p:ext>
+    </p:extLst>
+  </p:cSld>
+  <p:clrMapOvr>
+    <a:masterClrMapping/>
+  </p:clrMapOvr>
+</p:sld>
+</file>
+
+<file path=ppt/slides/slide9.xml><?xml version="1.0" encoding="utf-8"?>
+<p:sld xmlns:a="http://schemas.openxmlformats.org/drawingml/2006/main" xmlns:r="http://schemas.openxmlformats.org/officeDocument/2006/relationships" xmlns:p="http://schemas.openxmlformats.org/presentationml/2006/main">
+  <p:cSld>
+    <p:spTree>
+      <p:nvGrpSpPr>
+        <p:cNvPr id="1" name=""/>
+        <p:cNvGrpSpPr/>
+        <p:nvPr/>
+      </p:nvGrpSpPr>
+      <p:grpSpPr>
+        <a:xfrm>
+          <a:off x="0" y="0"/>
+          <a:ext cx="0" cy="0"/>
+          <a:chOff x="0" y="0"/>
+          <a:chExt cx="0" cy="0"/>
+        </a:xfrm>
+      </p:grpSpPr>
+      <p:sp>
+        <p:nvSpPr>
+          <p:cNvPr id="2" name="Title 1"/>
+          <p:cNvSpPr>
+            <a:spLocks noGrp="1"/>
+          </p:cNvSpPr>
+          <p:nvPr>
+            <p:ph type="title"/>
+          </p:nvPr>
+        </p:nvSpPr>
+        <p:spPr/>
+        <p:txBody>
+          <a:bodyPr/>
+          <a:lstStyle/>
+          <a:p>
+            <a:r>
+              <a:rPr lang="en-US" dirty="0" smtClean="0"/>
+              <a:t>Links of interest</a:t>
+            </a:r>
+            <a:endParaRPr lang="en-US" dirty="0"/>
+          </a:p>
+        </p:txBody>
+      </p:sp>
+      <p:sp>
+        <p:nvSpPr>
+          <p:cNvPr id="3" name="Content Placeholder 2"/>
+          <p:cNvSpPr>
+            <a:spLocks noGrp="1"/>
+          </p:cNvSpPr>
+          <p:nvPr>
+            <p:ph idx="1"/>
+          </p:nvPr>
+        </p:nvSpPr>
+        <p:spPr/>
+        <p:txBody>
+          <a:bodyPr/>
+          <a:lstStyle/>
+          <a:p>
+            <a:r>
+              <a:rPr lang="en-US" dirty="0" smtClean="0"/>
+              <a:t>Carnival POS</a:t>
+            </a:r>
+          </a:p>
+          <a:p>
+            <a:pPr lvl="1"/>
+            <a:r>
+              <a:rPr lang="en-US" dirty="0" smtClean="0">
+                <a:hlinkClick r:id="rId2"/>
+              </a:rPr>
+              <a:t>https</a:t>
+            </a:r>
+            <a:r>
+              <a:rPr lang="en-US" dirty="0">
+                <a:hlinkClick r:id="rId2"/>
+              </a:rPr>
+              <a:t>://carnival-pos.firebaseapp.com</a:t>
+            </a:r>
+            <a:r>
+              <a:rPr lang="en-US" dirty="0" smtClean="0">
+                <a:hlinkClick r:id="rId2"/>
+              </a:rPr>
+              <a:t>/</a:t>
+            </a:r>
+            <a:endParaRPr lang="en-US" dirty="0" smtClean="0"/>
+          </a:p>
+          <a:p>
+            <a:r>
+              <a:rPr lang="en-US" dirty="0" err="1" smtClean="0"/>
+              <a:t>Github</a:t>
+            </a:r>
+            <a:endParaRPr lang="en-US" dirty="0" smtClean="0"/>
+          </a:p>
+          <a:p>
+            <a:pPr lvl="1"/>
+            <a:r>
+              <a:rPr lang="en-US" dirty="0">
+                <a:hlinkClick r:id="rId3"/>
+              </a:rPr>
+              <a:t>https://github.com/code-monkie/carnival-pos</a:t>
+            </a:r>
+            <a:endParaRPr lang="en-US" dirty="0"/>
+          </a:p>
+          <a:p>
+            <a:r>
+              <a:rPr lang="en-US" dirty="0" smtClean="0"/>
+              <a:t>Firebase</a:t>
+            </a:r>
+          </a:p>
+          <a:p>
+            <a:pPr lvl="1"/>
+            <a:r>
+              <a:rPr lang="en-US" dirty="0">
+                <a:hlinkClick r:id="rId4"/>
+              </a:rPr>
+              <a:t>https://</a:t>
+            </a:r>
+            <a:r>
+              <a:rPr lang="en-US" dirty="0" smtClean="0">
+                <a:hlinkClick r:id="rId4"/>
+              </a:rPr>
+              <a:t>console.firebase.google.com/u/3/project/carnival-pos/overview</a:t>
+            </a:r>
+            <a:endParaRPr lang="en-US" dirty="0" smtClean="0"/>
+          </a:p>
+          <a:p>
+            <a:pPr lvl="1"/>
+            <a:endParaRPr lang="en-US" dirty="0"/>
+          </a:p>
+        </p:txBody>
+      </p:sp>
+    </p:spTree>
+    <p:extLst>
+      <p:ext uri="{BB962C8B-B14F-4D97-AF65-F5344CB8AC3E}">
+        <p14:creationId xmlns:p14="http://schemas.microsoft.com/office/powerpoint/2010/main" val="3477748009"/>
       </p:ext>
     </p:extLst>
   </p:cSld>

</xml_diff>